<commit_message>
Finished LaTeX template for presentation slides.
</commit_message>
<xml_diff>
--- a/presentazione/pics/backgnd.pptx
+++ b/presentazione/pics/backgnd.pptx
@@ -6,6 +6,7 @@
   </p:sldMasterIdLst>
   <p:sldIdLst>
     <p:sldId id="256" r:id="rId2"/>
+    <p:sldId id="257" r:id="rId3"/>
   </p:sldIdLst>
   <p:sldSz cx="9144000" cy="6858000" type="screen4x3"/>
   <p:notesSz cx="6858000" cy="9144000"/>
@@ -3205,6 +3206,453 @@
     <p:extLst>
       <p:ext uri="{BB962C8B-B14F-4D97-AF65-F5344CB8AC3E}">
         <p14:creationId xmlns:p14="http://schemas.microsoft.com/office/powerpoint/2010/main" val="1518377387"/>
+      </p:ext>
+    </p:extLst>
+  </p:cSld>
+  <p:clrMapOvr>
+    <a:masterClrMapping/>
+  </p:clrMapOvr>
+</p:sld>
+</file>
+
+<file path=ppt/slides/slide2.xml><?xml version="1.0" encoding="utf-8"?>
+<p:sld xmlns:a="http://schemas.openxmlformats.org/drawingml/2006/main" xmlns:r="http://schemas.openxmlformats.org/officeDocument/2006/relationships" xmlns:p="http://schemas.openxmlformats.org/presentationml/2006/main">
+  <p:cSld>
+    <p:spTree>
+      <p:nvGrpSpPr>
+        <p:cNvPr id="1" name=""/>
+        <p:cNvGrpSpPr/>
+        <p:nvPr/>
+      </p:nvGrpSpPr>
+      <p:grpSpPr>
+        <a:xfrm>
+          <a:off x="0" y="0"/>
+          <a:ext cx="0" cy="0"/>
+          <a:chOff x="0" y="0"/>
+          <a:chExt cx="0" cy="0"/>
+        </a:xfrm>
+      </p:grpSpPr>
+      <p:sp>
+        <p:nvSpPr>
+          <p:cNvPr id="2" name="Snip Diagonal Corner Rectangle 1"/>
+          <p:cNvSpPr/>
+          <p:nvPr/>
+        </p:nvSpPr>
+        <p:spPr>
+          <a:xfrm>
+            <a:off x="4088191" y="3846285"/>
+            <a:ext cx="914400" cy="914400"/>
+          </a:xfrm>
+          <a:prstGeom prst="snip2DiagRect">
+            <a:avLst/>
+          </a:prstGeom>
+        </p:spPr>
+        <p:style>
+          <a:lnRef idx="1">
+            <a:schemeClr val="accent1"/>
+          </a:lnRef>
+          <a:fillRef idx="3">
+            <a:schemeClr val="accent1"/>
+          </a:fillRef>
+          <a:effectRef idx="2">
+            <a:schemeClr val="accent1"/>
+          </a:effectRef>
+          <a:fontRef idx="minor">
+            <a:schemeClr val="lt1"/>
+          </a:fontRef>
+        </p:style>
+        <p:txBody>
+          <a:bodyPr rtlCol="0" anchor="ctr"/>
+          <a:lstStyle/>
+          <a:p>
+            <a:pPr algn="ctr"/>
+            <a:endParaRPr lang="en-US"/>
+          </a:p>
+        </p:txBody>
+      </p:sp>
+      <p:sp>
+        <p:nvSpPr>
+          <p:cNvPr id="3" name="Summing Junction 2"/>
+          <p:cNvSpPr/>
+          <p:nvPr/>
+        </p:nvSpPr>
+        <p:spPr>
+          <a:xfrm>
+            <a:off x="6102050" y="4482495"/>
+            <a:ext cx="665238" cy="641048"/>
+          </a:xfrm>
+          <a:prstGeom prst="flowChartSummingJunction">
+            <a:avLst/>
+          </a:prstGeom>
+        </p:spPr>
+        <p:style>
+          <a:lnRef idx="1">
+            <a:schemeClr val="accent1"/>
+          </a:lnRef>
+          <a:fillRef idx="3">
+            <a:schemeClr val="accent1"/>
+          </a:fillRef>
+          <a:effectRef idx="2">
+            <a:schemeClr val="accent1"/>
+          </a:effectRef>
+          <a:fontRef idx="minor">
+            <a:schemeClr val="lt1"/>
+          </a:fontRef>
+        </p:style>
+        <p:txBody>
+          <a:bodyPr rtlCol="0" anchor="ctr"/>
+          <a:lstStyle/>
+          <a:p>
+            <a:pPr algn="ctr"/>
+            <a:endParaRPr lang="en-US"/>
+          </a:p>
+        </p:txBody>
+      </p:sp>
+      <p:sp>
+        <p:nvSpPr>
+          <p:cNvPr id="4" name="Equal 3"/>
+          <p:cNvSpPr/>
+          <p:nvPr/>
+        </p:nvSpPr>
+        <p:spPr>
+          <a:xfrm>
+            <a:off x="5950857" y="2526614"/>
+            <a:ext cx="914400" cy="914400"/>
+          </a:xfrm>
+          <a:prstGeom prst="mathEqual">
+            <a:avLst/>
+          </a:prstGeom>
+        </p:spPr>
+        <p:style>
+          <a:lnRef idx="1">
+            <a:schemeClr val="accent1"/>
+          </a:lnRef>
+          <a:fillRef idx="3">
+            <a:schemeClr val="accent1"/>
+          </a:fillRef>
+          <a:effectRef idx="2">
+            <a:schemeClr val="accent1"/>
+          </a:effectRef>
+          <a:fontRef idx="minor">
+            <a:schemeClr val="lt1"/>
+          </a:fontRef>
+        </p:style>
+        <p:txBody>
+          <a:bodyPr rtlCol="0" anchor="ctr"/>
+          <a:lstStyle/>
+          <a:p>
+            <a:pPr algn="ctr"/>
+            <a:endParaRPr lang="en-US">
+              <a:solidFill>
+                <a:schemeClr val="tx1"/>
+              </a:solidFill>
+            </a:endParaRPr>
+          </a:p>
+        </p:txBody>
+      </p:sp>
+      <p:sp>
+        <p:nvSpPr>
+          <p:cNvPr id="5" name="Quad Arrow 4"/>
+          <p:cNvSpPr/>
+          <p:nvPr/>
+        </p:nvSpPr>
+        <p:spPr>
+          <a:xfrm>
+            <a:off x="3616477" y="1310462"/>
+            <a:ext cx="1216152" cy="1216152"/>
+          </a:xfrm>
+          <a:prstGeom prst="quadArrow">
+            <a:avLst/>
+          </a:prstGeom>
+        </p:spPr>
+        <p:style>
+          <a:lnRef idx="1">
+            <a:schemeClr val="accent1"/>
+          </a:lnRef>
+          <a:fillRef idx="3">
+            <a:schemeClr val="accent1"/>
+          </a:fillRef>
+          <a:effectRef idx="2">
+            <a:schemeClr val="accent1"/>
+          </a:effectRef>
+          <a:fontRef idx="minor">
+            <a:schemeClr val="lt1"/>
+          </a:fontRef>
+        </p:style>
+        <p:txBody>
+          <a:bodyPr rtlCol="0" anchor="ctr"/>
+          <a:lstStyle/>
+          <a:p>
+            <a:pPr algn="ctr"/>
+            <a:endParaRPr lang="en-US"/>
+          </a:p>
+        </p:txBody>
+      </p:sp>
+      <p:cxnSp>
+        <p:nvCxnSpPr>
+          <p:cNvPr id="7" name="Elbow Connector 6"/>
+          <p:cNvCxnSpPr>
+            <a:stCxn id="3" idx="0"/>
+          </p:cNvCxnSpPr>
+          <p:nvPr/>
+        </p:nvCxnSpPr>
+        <p:spPr>
+          <a:xfrm rot="5400000" flipH="1" flipV="1">
+            <a:off x="5811120" y="3858946"/>
+            <a:ext cx="1247099" cy="1"/>
+          </a:xfrm>
+          <a:prstGeom prst="bentConnector3">
+            <a:avLst/>
+          </a:prstGeom>
+          <a:ln>
+            <a:tailEnd type="arrow"/>
+          </a:ln>
+        </p:spPr>
+        <p:style>
+          <a:lnRef idx="2">
+            <a:schemeClr val="accent1"/>
+          </a:lnRef>
+          <a:fillRef idx="0">
+            <a:schemeClr val="accent1"/>
+          </a:fillRef>
+          <a:effectRef idx="1">
+            <a:schemeClr val="accent1"/>
+          </a:effectRef>
+          <a:fontRef idx="minor">
+            <a:schemeClr val="tx1"/>
+          </a:fontRef>
+        </p:style>
+      </p:cxnSp>
+      <p:cxnSp>
+        <p:nvCxnSpPr>
+          <p:cNvPr id="16" name="Straight Connector 15"/>
+          <p:cNvCxnSpPr>
+            <a:stCxn id="5" idx="2"/>
+            <a:endCxn id="3" idx="1"/>
+          </p:cNvCxnSpPr>
+          <p:nvPr/>
+        </p:nvCxnSpPr>
+        <p:spPr>
+          <a:xfrm>
+            <a:off x="4224553" y="2526614"/>
+            <a:ext cx="1974919" cy="2049760"/>
+          </a:xfrm>
+          <a:prstGeom prst="line">
+            <a:avLst/>
+          </a:prstGeom>
+        </p:spPr>
+        <p:style>
+          <a:lnRef idx="2">
+            <a:schemeClr val="accent1"/>
+          </a:lnRef>
+          <a:fillRef idx="0">
+            <a:schemeClr val="accent1"/>
+          </a:fillRef>
+          <a:effectRef idx="1">
+            <a:schemeClr val="accent1"/>
+          </a:effectRef>
+          <a:fontRef idx="minor">
+            <a:schemeClr val="tx1"/>
+          </a:fontRef>
+        </p:style>
+      </p:cxnSp>
+      <p:cxnSp>
+        <p:nvCxnSpPr>
+          <p:cNvPr id="19" name="Elbow Connector 18"/>
+          <p:cNvCxnSpPr>
+            <a:stCxn id="5" idx="0"/>
+            <a:endCxn id="4" idx="5"/>
+          </p:cNvCxnSpPr>
+          <p:nvPr/>
+        </p:nvCxnSpPr>
+        <p:spPr>
+          <a:xfrm rot="16200000" flipH="1">
+            <a:off x="4614046" y="920969"/>
+            <a:ext cx="1404518" cy="2183504"/>
+          </a:xfrm>
+          <a:prstGeom prst="bentConnector3">
+            <a:avLst>
+              <a:gd name="adj1" fmla="val -16276"/>
+            </a:avLst>
+          </a:prstGeom>
+          <a:ln>
+            <a:headEnd type="arrow"/>
+            <a:tailEnd type="arrow"/>
+          </a:ln>
+        </p:spPr>
+        <p:style>
+          <a:lnRef idx="2">
+            <a:schemeClr val="accent1"/>
+          </a:lnRef>
+          <a:fillRef idx="0">
+            <a:schemeClr val="accent1"/>
+          </a:fillRef>
+          <a:effectRef idx="1">
+            <a:schemeClr val="accent1"/>
+          </a:effectRef>
+          <a:fontRef idx="minor">
+            <a:schemeClr val="tx1"/>
+          </a:fontRef>
+        </p:style>
+      </p:cxnSp>
+      <p:sp>
+        <p:nvSpPr>
+          <p:cNvPr id="21" name="Line Callout 3 (Accent Bar) 20"/>
+          <p:cNvSpPr/>
+          <p:nvPr/>
+        </p:nvSpPr>
+        <p:spPr>
+          <a:xfrm>
+            <a:off x="7118050" y="5389639"/>
+            <a:ext cx="914400" cy="612648"/>
+          </a:xfrm>
+          <a:prstGeom prst="accentCallout3">
+            <a:avLst/>
+          </a:prstGeom>
+        </p:spPr>
+        <p:style>
+          <a:lnRef idx="1">
+            <a:schemeClr val="accent1"/>
+          </a:lnRef>
+          <a:fillRef idx="3">
+            <a:schemeClr val="accent1"/>
+          </a:fillRef>
+          <a:effectRef idx="2">
+            <a:schemeClr val="accent1"/>
+          </a:effectRef>
+          <a:fontRef idx="minor">
+            <a:schemeClr val="lt1"/>
+          </a:fontRef>
+        </p:style>
+        <p:txBody>
+          <a:bodyPr rtlCol="0" anchor="ctr"/>
+          <a:lstStyle/>
+          <a:p>
+            <a:pPr algn="ctr"/>
+            <a:endParaRPr lang="en-US"/>
+          </a:p>
+        </p:txBody>
+      </p:sp>
+      <p:sp>
+        <p:nvSpPr>
+          <p:cNvPr id="22" name="Moon 21"/>
+          <p:cNvSpPr/>
+          <p:nvPr/>
+        </p:nvSpPr>
+        <p:spPr>
+          <a:xfrm rot="2291923">
+            <a:off x="5236370" y="4703214"/>
+            <a:ext cx="457200" cy="914400"/>
+          </a:xfrm>
+          <a:prstGeom prst="moon">
+            <a:avLst/>
+          </a:prstGeom>
+        </p:spPr>
+        <p:style>
+          <a:lnRef idx="1">
+            <a:schemeClr val="accent1"/>
+          </a:lnRef>
+          <a:fillRef idx="3">
+            <a:schemeClr val="accent1"/>
+          </a:fillRef>
+          <a:effectRef idx="2">
+            <a:schemeClr val="accent1"/>
+          </a:effectRef>
+          <a:fontRef idx="minor">
+            <a:schemeClr val="lt1"/>
+          </a:fontRef>
+        </p:style>
+        <p:txBody>
+          <a:bodyPr rtlCol="0" anchor="ctr"/>
+          <a:lstStyle/>
+          <a:p>
+            <a:pPr algn="ctr"/>
+            <a:endParaRPr lang="en-US"/>
+          </a:p>
+        </p:txBody>
+      </p:sp>
+      <p:sp>
+        <p:nvSpPr>
+          <p:cNvPr id="23" name="Multidocument 22"/>
+          <p:cNvSpPr/>
+          <p:nvPr/>
+        </p:nvSpPr>
+        <p:spPr>
+          <a:xfrm>
+            <a:off x="3120571" y="5389639"/>
+            <a:ext cx="1060704" cy="758952"/>
+          </a:xfrm>
+          <a:prstGeom prst="flowChartMultidocument">
+            <a:avLst/>
+          </a:prstGeom>
+        </p:spPr>
+        <p:style>
+          <a:lnRef idx="1">
+            <a:schemeClr val="accent1"/>
+          </a:lnRef>
+          <a:fillRef idx="3">
+            <a:schemeClr val="accent1"/>
+          </a:fillRef>
+          <a:effectRef idx="2">
+            <a:schemeClr val="accent1"/>
+          </a:effectRef>
+          <a:fontRef idx="minor">
+            <a:schemeClr val="lt1"/>
+          </a:fontRef>
+        </p:style>
+        <p:txBody>
+          <a:bodyPr rtlCol="0" anchor="ctr"/>
+          <a:lstStyle/>
+          <a:p>
+            <a:pPr algn="ctr"/>
+            <a:endParaRPr lang="en-US"/>
+          </a:p>
+        </p:txBody>
+      </p:sp>
+      <p:sp>
+        <p:nvSpPr>
+          <p:cNvPr id="24" name="Action Button: Home 23">
+            <a:hlinkClick r:id="" action="ppaction://hlinkshowjump?jump=firstslide" highlightClick="1"/>
+          </p:cNvPr>
+          <p:cNvSpPr/>
+          <p:nvPr/>
+        </p:nvSpPr>
+        <p:spPr>
+          <a:xfrm>
+            <a:off x="2225523" y="2803869"/>
+            <a:ext cx="1042416" cy="1042416"/>
+          </a:xfrm>
+          <a:prstGeom prst="actionButtonHome">
+            <a:avLst/>
+          </a:prstGeom>
+        </p:spPr>
+        <p:style>
+          <a:lnRef idx="1">
+            <a:schemeClr val="accent1"/>
+          </a:lnRef>
+          <a:fillRef idx="3">
+            <a:schemeClr val="accent1"/>
+          </a:fillRef>
+          <a:effectRef idx="2">
+            <a:schemeClr val="accent1"/>
+          </a:effectRef>
+          <a:fontRef idx="minor">
+            <a:schemeClr val="lt1"/>
+          </a:fontRef>
+        </p:style>
+        <p:txBody>
+          <a:bodyPr rtlCol="0" anchor="ctr"/>
+          <a:lstStyle/>
+          <a:p>
+            <a:pPr algn="ctr"/>
+            <a:endParaRPr lang="en-US"/>
+          </a:p>
+        </p:txBody>
+      </p:sp>
+    </p:spTree>
+    <p:extLst>
+      <p:ext uri="{BB962C8B-B14F-4D97-AF65-F5344CB8AC3E}">
+        <p14:creationId xmlns:p14="http://schemas.microsoft.com/office/powerpoint/2010/main" val="296739862"/>
       </p:ext>
     </p:extLst>
   </p:cSld>

</xml_diff>